<commit_message>
test new pptx functions
</commit_message>
<xml_diff>
--- a/inst/extdata/template_169.pptx
+++ b/inst/extdata/template_169.pptx
@@ -956,7 +956,7 @@
           <a:p>
             <a:fld id="{862C827D-FC0C-184A-B855-165F1307D257}" type="datetimeFigureOut">
               <a:rPr lang="en-US" smtClean="0"/>
-              <a:t>3/22/19</a:t>
+              <a:t>5/12/20</a:t>
             </a:fld>
             <a:endParaRPr lang="en-US"/>
           </a:p>
@@ -1306,7 +1306,7 @@
           <a:p>
             <a:fld id="{862C827D-FC0C-184A-B855-165F1307D257}" type="datetimeFigureOut">
               <a:rPr lang="en-US" smtClean="0"/>
-              <a:t>3/22/19</a:t>
+              <a:t>5/12/20</a:t>
             </a:fld>
             <a:endParaRPr lang="en-US"/>
           </a:p>
@@ -1396,13 +1396,19 @@
         </p:nvSpPr>
         <p:spPr>
           <a:xfrm>
-            <a:off x="864000" y="425789"/>
-            <a:ext cx="8904408" cy="369332"/>
+            <a:off x="864000" y="188640"/>
+            <a:ext cx="9035374" cy="606481"/>
           </a:xfrm>
         </p:spPr>
         <p:txBody>
-          <a:bodyPr/>
-          <a:lstStyle/>
+          <a:bodyPr anchor="b">
+            <a:noAutofit/>
+          </a:bodyPr>
+          <a:lstStyle>
+            <a:lvl1pPr algn="l">
+              <a:defRPr sz="1800"/>
+            </a:lvl1pPr>
+          </a:lstStyle>
           <a:p>
             <a:r>
               <a:rPr lang="en-US" dirty="0"/>
@@ -1418,45 +1424,60 @@
             <a:spLocks noGrp="1"/>
           </p:cNvSpPr>
           <p:nvPr>
-            <p:ph sz="half" idx="1"/>
+            <p:ph sz="half" idx="1" hasCustomPrompt="1"/>
           </p:nvPr>
         </p:nvSpPr>
         <p:spPr>
           <a:xfrm>
-            <a:off x="864000" y="918844"/>
-            <a:ext cx="10656000" cy="554444"/>
+            <a:off x="851790" y="908720"/>
+            <a:ext cx="10656000" cy="1357295"/>
           </a:xfrm>
         </p:spPr>
         <p:txBody>
           <a:bodyPr/>
           <a:lstStyle>
             <a:lvl1pPr>
+              <a:lnSpc>
+                <a:spcPct val="90000"/>
+              </a:lnSpc>
               <a:spcAft>
-                <a:spcPts val="1800"/>
+                <a:spcPts val="0"/>
               </a:spcAft>
               <a:defRPr/>
             </a:lvl1pPr>
             <a:lvl2pPr>
+              <a:lnSpc>
+                <a:spcPct val="90000"/>
+              </a:lnSpc>
               <a:spcAft>
-                <a:spcPts val="1800"/>
+                <a:spcPts val="0"/>
               </a:spcAft>
               <a:defRPr/>
             </a:lvl2pPr>
             <a:lvl3pPr>
+              <a:lnSpc>
+                <a:spcPct val="90000"/>
+              </a:lnSpc>
               <a:spcAft>
-                <a:spcPts val="1800"/>
+                <a:spcPts val="0"/>
               </a:spcAft>
               <a:defRPr/>
             </a:lvl3pPr>
             <a:lvl4pPr>
+              <a:lnSpc>
+                <a:spcPct val="90000"/>
+              </a:lnSpc>
               <a:spcAft>
-                <a:spcPts val="1800"/>
+                <a:spcPts val="0"/>
               </a:spcAft>
               <a:defRPr/>
             </a:lvl4pPr>
             <a:lvl5pPr>
+              <a:lnSpc>
+                <a:spcPct val="90000"/>
+              </a:lnSpc>
               <a:spcAft>
-                <a:spcPts val="1800"/>
+                <a:spcPts val="0"/>
               </a:spcAft>
               <a:defRPr/>
             </a:lvl5pPr>
@@ -1465,7 +1486,14 @@
             <a:pPr lvl="0"/>
             <a:r>
               <a:rPr lang="en-US" dirty="0"/>
-              <a:t>Edit Master text styles</a:t>
+              <a:t>Edit Master </a:t>
+            </a:r>
+          </a:p>
+          <a:p>
+            <a:pPr lvl="0"/>
+            <a:r>
+              <a:rPr lang="en-US" dirty="0"/>
+              <a:t>text styles</a:t>
             </a:r>
           </a:p>
           <a:p>
@@ -1510,8 +1538,8 @@
         </p:nvSpPr>
         <p:spPr>
           <a:xfrm>
-            <a:off x="864000" y="1477728"/>
-            <a:ext cx="10800000" cy="5220000"/>
+            <a:off x="850748" y="1412776"/>
+            <a:ext cx="10800000" cy="5445224"/>
           </a:xfrm>
         </p:spPr>
         <p:txBody>
@@ -1617,7 +1645,7 @@
           <a:p>
             <a:fld id="{862C827D-FC0C-184A-B855-165F1307D257}" type="datetimeFigureOut">
               <a:rPr lang="en-US" smtClean="0"/>
-              <a:t>3/22/19</a:t>
+              <a:t>5/12/20</a:t>
             </a:fld>
             <a:endParaRPr lang="en-US"/>
           </a:p>
@@ -1948,8 +1976,8 @@
         </p:nvSpPr>
         <p:spPr bwMode="auto">
           <a:xfrm>
-            <a:off x="864000" y="425789"/>
-            <a:ext cx="8509000" cy="369332"/>
+            <a:off x="864000" y="518122"/>
+            <a:ext cx="8509000" cy="276999"/>
           </a:xfrm>
           <a:prstGeom prst="rect">
             <a:avLst/>
@@ -1973,10 +2001,9 @@
           <a:p>
             <a:pPr lvl="0"/>
             <a:r>
-              <a:rPr lang="en-US"/>
+              <a:rPr lang="en-US" dirty="0"/>
               <a:t>Click to edit Master title style</a:t>
             </a:r>
-            <a:endParaRPr lang="en-US" dirty="0"/>
           </a:p>
         </p:txBody>
       </p:sp>
@@ -2186,7 +2213,7 @@
           <a:p>
             <a:fld id="{862C827D-FC0C-184A-B855-165F1307D257}" type="datetimeFigureOut">
               <a:rPr lang="en-US" smtClean="0"/>
-              <a:t>3/22/19</a:t>
+              <a:t>5/12/20</a:t>
             </a:fld>
             <a:endParaRPr lang="en-US"/>
           </a:p>
@@ -2302,7 +2329,7 @@
         <a:spcAft>
           <a:spcPct val="0"/>
         </a:spcAft>
-        <a:defRPr sz="2400" b="1">
+        <a:defRPr sz="1800" b="1">
           <a:solidFill>
             <a:schemeClr val="tx1"/>
           </a:solidFill>

</xml_diff>

<commit_message>
New powerpoint functions (#143)
* break out slide assembly function

* speaker notes from graph labels

* path to script not in slide notes

* tweak make_slide

* grattan_save_pptx_onetype replaces make_slide and make_presentation

* minimal grattan_save_pptx working

* rmarkdown method working

* pptx with "two-stage" (Rmd, then officer) process working

* test new pptx functions

* grattan_save working with pptx argument, documentation created

* update documentation, iterate version number
</commit_message>
<xml_diff>
--- a/inst/extdata/template_169.pptx
+++ b/inst/extdata/template_169.pptx
@@ -956,7 +956,7 @@
           <a:p>
             <a:fld id="{862C827D-FC0C-184A-B855-165F1307D257}" type="datetimeFigureOut">
               <a:rPr lang="en-US" smtClean="0"/>
-              <a:t>3/22/19</a:t>
+              <a:t>5/12/20</a:t>
             </a:fld>
             <a:endParaRPr lang="en-US"/>
           </a:p>
@@ -1306,7 +1306,7 @@
           <a:p>
             <a:fld id="{862C827D-FC0C-184A-B855-165F1307D257}" type="datetimeFigureOut">
               <a:rPr lang="en-US" smtClean="0"/>
-              <a:t>3/22/19</a:t>
+              <a:t>5/12/20</a:t>
             </a:fld>
             <a:endParaRPr lang="en-US"/>
           </a:p>
@@ -1396,13 +1396,19 @@
         </p:nvSpPr>
         <p:spPr>
           <a:xfrm>
-            <a:off x="864000" y="425789"/>
-            <a:ext cx="8904408" cy="369332"/>
+            <a:off x="864000" y="188640"/>
+            <a:ext cx="9035374" cy="606481"/>
           </a:xfrm>
         </p:spPr>
         <p:txBody>
-          <a:bodyPr/>
-          <a:lstStyle/>
+          <a:bodyPr anchor="b">
+            <a:noAutofit/>
+          </a:bodyPr>
+          <a:lstStyle>
+            <a:lvl1pPr algn="l">
+              <a:defRPr sz="1800"/>
+            </a:lvl1pPr>
+          </a:lstStyle>
           <a:p>
             <a:r>
               <a:rPr lang="en-US" dirty="0"/>
@@ -1418,45 +1424,60 @@
             <a:spLocks noGrp="1"/>
           </p:cNvSpPr>
           <p:nvPr>
-            <p:ph sz="half" idx="1"/>
+            <p:ph sz="half" idx="1" hasCustomPrompt="1"/>
           </p:nvPr>
         </p:nvSpPr>
         <p:spPr>
           <a:xfrm>
-            <a:off x="864000" y="918844"/>
-            <a:ext cx="10656000" cy="554444"/>
+            <a:off x="851790" y="908720"/>
+            <a:ext cx="10656000" cy="1357295"/>
           </a:xfrm>
         </p:spPr>
         <p:txBody>
           <a:bodyPr/>
           <a:lstStyle>
             <a:lvl1pPr>
+              <a:lnSpc>
+                <a:spcPct val="90000"/>
+              </a:lnSpc>
               <a:spcAft>
-                <a:spcPts val="1800"/>
+                <a:spcPts val="0"/>
               </a:spcAft>
               <a:defRPr/>
             </a:lvl1pPr>
             <a:lvl2pPr>
+              <a:lnSpc>
+                <a:spcPct val="90000"/>
+              </a:lnSpc>
               <a:spcAft>
-                <a:spcPts val="1800"/>
+                <a:spcPts val="0"/>
               </a:spcAft>
               <a:defRPr/>
             </a:lvl2pPr>
             <a:lvl3pPr>
+              <a:lnSpc>
+                <a:spcPct val="90000"/>
+              </a:lnSpc>
               <a:spcAft>
-                <a:spcPts val="1800"/>
+                <a:spcPts val="0"/>
               </a:spcAft>
               <a:defRPr/>
             </a:lvl3pPr>
             <a:lvl4pPr>
+              <a:lnSpc>
+                <a:spcPct val="90000"/>
+              </a:lnSpc>
               <a:spcAft>
-                <a:spcPts val="1800"/>
+                <a:spcPts val="0"/>
               </a:spcAft>
               <a:defRPr/>
             </a:lvl4pPr>
             <a:lvl5pPr>
+              <a:lnSpc>
+                <a:spcPct val="90000"/>
+              </a:lnSpc>
               <a:spcAft>
-                <a:spcPts val="1800"/>
+                <a:spcPts val="0"/>
               </a:spcAft>
               <a:defRPr/>
             </a:lvl5pPr>
@@ -1465,7 +1486,14 @@
             <a:pPr lvl="0"/>
             <a:r>
               <a:rPr lang="en-US" dirty="0"/>
-              <a:t>Edit Master text styles</a:t>
+              <a:t>Edit Master </a:t>
+            </a:r>
+          </a:p>
+          <a:p>
+            <a:pPr lvl="0"/>
+            <a:r>
+              <a:rPr lang="en-US" dirty="0"/>
+              <a:t>text styles</a:t>
             </a:r>
           </a:p>
           <a:p>
@@ -1510,8 +1538,8 @@
         </p:nvSpPr>
         <p:spPr>
           <a:xfrm>
-            <a:off x="864000" y="1477728"/>
-            <a:ext cx="10800000" cy="5220000"/>
+            <a:off x="850748" y="1412776"/>
+            <a:ext cx="10800000" cy="5445224"/>
           </a:xfrm>
         </p:spPr>
         <p:txBody>
@@ -1617,7 +1645,7 @@
           <a:p>
             <a:fld id="{862C827D-FC0C-184A-B855-165F1307D257}" type="datetimeFigureOut">
               <a:rPr lang="en-US" smtClean="0"/>
-              <a:t>3/22/19</a:t>
+              <a:t>5/12/20</a:t>
             </a:fld>
             <a:endParaRPr lang="en-US"/>
           </a:p>
@@ -1948,8 +1976,8 @@
         </p:nvSpPr>
         <p:spPr bwMode="auto">
           <a:xfrm>
-            <a:off x="864000" y="425789"/>
-            <a:ext cx="8509000" cy="369332"/>
+            <a:off x="864000" y="518122"/>
+            <a:ext cx="8509000" cy="276999"/>
           </a:xfrm>
           <a:prstGeom prst="rect">
             <a:avLst/>
@@ -1973,10 +2001,9 @@
           <a:p>
             <a:pPr lvl="0"/>
             <a:r>
-              <a:rPr lang="en-US"/>
+              <a:rPr lang="en-US" dirty="0"/>
               <a:t>Click to edit Master title style</a:t>
             </a:r>
-            <a:endParaRPr lang="en-US" dirty="0"/>
           </a:p>
         </p:txBody>
       </p:sp>
@@ -2186,7 +2213,7 @@
           <a:p>
             <a:fld id="{862C827D-FC0C-184A-B855-165F1307D257}" type="datetimeFigureOut">
               <a:rPr lang="en-US" smtClean="0"/>
-              <a:t>3/22/19</a:t>
+              <a:t>5/12/20</a:t>
             </a:fld>
             <a:endParaRPr lang="en-US"/>
           </a:p>
@@ -2302,7 +2329,7 @@
         <a:spcAft>
           <a:spcPct val="0"/>
         </a:spcAft>
-        <a:defRPr sz="2400" b="1">
+        <a:defRPr sz="1800" b="1">
           <a:solidFill>
             <a:schemeClr val="tx1"/>
           </a:solidFill>

</xml_diff>

<commit_message>
ensure title and subtitle are blank (not filled in with master text) when graph has not title and subtitle
</commit_message>
<xml_diff>
--- a/inst/extdata/template_169.pptx
+++ b/inst/extdata/template_169.pptx
@@ -956,7 +956,7 @@
           <a:p>
             <a:fld id="{862C827D-FC0C-184A-B855-165F1307D257}" type="datetimeFigureOut">
               <a:rPr lang="en-US" smtClean="0"/>
-              <a:t>5/12/20</a:t>
+              <a:t>5/21/20</a:t>
             </a:fld>
             <a:endParaRPr lang="en-US"/>
           </a:p>
@@ -1306,7 +1306,7 @@
           <a:p>
             <a:fld id="{862C827D-FC0C-184A-B855-165F1307D257}" type="datetimeFigureOut">
               <a:rPr lang="en-US" smtClean="0"/>
-              <a:t>5/12/20</a:t>
+              <a:t>5/21/20</a:t>
             </a:fld>
             <a:endParaRPr lang="en-US"/>
           </a:p>
@@ -1391,7 +1391,7 @@
             <a:spLocks noGrp="1"/>
           </p:cNvSpPr>
           <p:nvPr>
-            <p:ph type="title"/>
+            <p:ph type="title" hasCustomPrompt="1"/>
           </p:nvPr>
         </p:nvSpPr>
         <p:spPr>
@@ -1412,7 +1412,7 @@
           <a:p>
             <a:r>
               <a:rPr lang="en-US" dirty="0"/>
-              <a:t>Click to edit Master title style</a:t>
+              <a:t> </a:t>
             </a:r>
           </a:p>
         </p:txBody>
@@ -1430,7 +1430,7 @@
         <p:spPr>
           <a:xfrm>
             <a:off x="851790" y="908720"/>
-            <a:ext cx="10656000" cy="1357295"/>
+            <a:ext cx="10656000" cy="249299"/>
           </a:xfrm>
         </p:spPr>
         <p:txBody>
@@ -1486,42 +1486,7 @@
             <a:pPr lvl="0"/>
             <a:r>
               <a:rPr lang="en-US" dirty="0"/>
-              <a:t>Edit Master </a:t>
-            </a:r>
-          </a:p>
-          <a:p>
-            <a:pPr lvl="0"/>
-            <a:r>
-              <a:rPr lang="en-US" dirty="0"/>
-              <a:t>text styles</a:t>
-            </a:r>
-          </a:p>
-          <a:p>
-            <a:pPr lvl="1"/>
-            <a:r>
-              <a:rPr lang="en-US" dirty="0"/>
-              <a:t>Second level</a:t>
-            </a:r>
-          </a:p>
-          <a:p>
-            <a:pPr lvl="2"/>
-            <a:r>
-              <a:rPr lang="en-US" dirty="0"/>
-              <a:t>Third level</a:t>
-            </a:r>
-          </a:p>
-          <a:p>
-            <a:pPr lvl="3"/>
-            <a:r>
-              <a:rPr lang="en-US" dirty="0"/>
-              <a:t>Fourth level</a:t>
-            </a:r>
-          </a:p>
-          <a:p>
-            <a:pPr lvl="4"/>
-            <a:r>
-              <a:rPr lang="en-US" dirty="0"/>
-              <a:t>Fifth level</a:t>
+              <a:t> </a:t>
             </a:r>
           </a:p>
         </p:txBody>
@@ -1645,7 +1610,7 @@
           <a:p>
             <a:fld id="{862C827D-FC0C-184A-B855-165F1307D257}" type="datetimeFigureOut">
               <a:rPr lang="en-US" smtClean="0"/>
-              <a:t>5/12/20</a:t>
+              <a:t>5/21/20</a:t>
             </a:fld>
             <a:endParaRPr lang="en-US"/>
           </a:p>
@@ -2213,7 +2178,7 @@
           <a:p>
             <a:fld id="{862C827D-FC0C-184A-B855-165F1307D257}" type="datetimeFigureOut">
               <a:rPr lang="en-US" smtClean="0"/>
-              <a:t>5/12/20</a:t>
+              <a:t>5/21/20</a:t>
             </a:fld>
             <a:endParaRPr lang="en-US"/>
           </a:p>

</xml_diff>

<commit_message>
add useless additional layouts
</commit_message>
<xml_diff>
--- a/inst/extdata/template_169.pptx
+++ b/inst/extdata/template_169.pptx
@@ -623,7 +623,7 @@
 
 <file path=ppt/slideLayouts/slideLayout1.xml><?xml version="1.0" encoding="utf-8"?>
 <p:sldLayout xmlns:a="http://schemas.openxmlformats.org/drawingml/2006/main" xmlns:r="http://schemas.openxmlformats.org/officeDocument/2006/relationships" xmlns:p="http://schemas.openxmlformats.org/presentationml/2006/main" showMasterSp="0" preserve="1" userDrawn="1">
-  <p:cSld name="1_Title Slide">
+  <p:cSld name="Section Header">
     <p:spTree>
       <p:nvGrpSpPr>
         <p:cNvPr id="1" name=""/>
@@ -956,7 +956,7 @@
           <a:p>
             <a:fld id="{862C827D-FC0C-184A-B855-165F1307D257}" type="datetimeFigureOut">
               <a:rPr lang="en-US" smtClean="0"/>
-              <a:t>5/21/20</a:t>
+              <a:t>4/1/22</a:t>
             </a:fld>
             <a:endParaRPr lang="en-US"/>
           </a:p>
@@ -1306,7 +1306,7 @@
           <a:p>
             <a:fld id="{862C827D-FC0C-184A-B855-165F1307D257}" type="datetimeFigureOut">
               <a:rPr lang="en-US" smtClean="0"/>
-              <a:t>5/21/20</a:t>
+              <a:t>4/1/22</a:t>
             </a:fld>
             <a:endParaRPr lang="en-US"/>
           </a:p>
@@ -1610,7 +1610,7 @@
           <a:p>
             <a:fld id="{862C827D-FC0C-184A-B855-165F1307D257}" type="datetimeFigureOut">
               <a:rPr lang="en-US" smtClean="0"/>
-              <a:t>5/21/20</a:t>
+              <a:t>4/1/22</a:t>
             </a:fld>
             <a:endParaRPr lang="en-US"/>
           </a:p>
@@ -1904,6 +1904,183 @@
 </p:sldLayout>
 </file>
 
+<file path=ppt/slideLayouts/slideLayout6.xml><?xml version="1.0" encoding="utf-8"?>
+<p:sldLayout xmlns:a="http://schemas.openxmlformats.org/drawingml/2006/main" xmlns:r="http://schemas.openxmlformats.org/officeDocument/2006/relationships" xmlns:p="http://schemas.openxmlformats.org/presentationml/2006/main" preserve="1" userDrawn="1">
+  <p:cSld name="Blank">
+    <p:spTree>
+      <p:nvGrpSpPr>
+        <p:cNvPr id="1" name=""/>
+        <p:cNvGrpSpPr/>
+        <p:nvPr/>
+      </p:nvGrpSpPr>
+      <p:grpSpPr>
+        <a:xfrm>
+          <a:off x="0" y="0"/>
+          <a:ext cx="0" cy="0"/>
+          <a:chOff x="0" y="0"/>
+          <a:chExt cx="0" cy="0"/>
+        </a:xfrm>
+      </p:grpSpPr>
+      <p:sp>
+        <p:nvSpPr>
+          <p:cNvPr id="2" name="Title 1">
+            <a:extLst>
+              <a:ext uri="{FF2B5EF4-FFF2-40B4-BE49-F238E27FC236}">
+                <a16:creationId xmlns:a16="http://schemas.microsoft.com/office/drawing/2014/main" id="{6BC17464-26F0-F70E-03FB-7D458DC13FC5}"/>
+              </a:ext>
+            </a:extLst>
+          </p:cNvPr>
+          <p:cNvSpPr>
+            <a:spLocks noGrp="1"/>
+          </p:cNvSpPr>
+          <p:nvPr>
+            <p:ph type="title"/>
+          </p:nvPr>
+        </p:nvSpPr>
+        <p:spPr/>
+        <p:txBody>
+          <a:bodyPr/>
+          <a:lstStyle/>
+          <a:p>
+            <a:r>
+              <a:rPr lang="en-US"/>
+              <a:t>Click to edit Master title style</a:t>
+            </a:r>
+            <a:endParaRPr lang="en-AU"/>
+          </a:p>
+        </p:txBody>
+      </p:sp>
+    </p:spTree>
+    <p:extLst>
+      <p:ext uri="{BB962C8B-B14F-4D97-AF65-F5344CB8AC3E}">
+        <p14:creationId xmlns:p14="http://schemas.microsoft.com/office/powerpoint/2010/main" val="972569541"/>
+      </p:ext>
+    </p:extLst>
+  </p:cSld>
+  <p:clrMapOvr>
+    <a:masterClrMapping/>
+  </p:clrMapOvr>
+</p:sldLayout>
+</file>
+
+<file path=ppt/slideLayouts/slideLayout7.xml><?xml version="1.0" encoding="utf-8"?>
+<p:sldLayout xmlns:a="http://schemas.openxmlformats.org/drawingml/2006/main" xmlns:r="http://schemas.openxmlformats.org/officeDocument/2006/relationships" xmlns:p="http://schemas.openxmlformats.org/presentationml/2006/main" preserve="1" userDrawn="1">
+  <p:cSld name="Comparison">
+    <p:spTree>
+      <p:nvGrpSpPr>
+        <p:cNvPr id="1" name=""/>
+        <p:cNvGrpSpPr/>
+        <p:nvPr/>
+      </p:nvGrpSpPr>
+      <p:grpSpPr>
+        <a:xfrm>
+          <a:off x="0" y="0"/>
+          <a:ext cx="0" cy="0"/>
+          <a:chOff x="0" y="0"/>
+          <a:chExt cx="0" cy="0"/>
+        </a:xfrm>
+      </p:grpSpPr>
+      <p:sp>
+        <p:nvSpPr>
+          <p:cNvPr id="2" name="Title 1">
+            <a:extLst>
+              <a:ext uri="{FF2B5EF4-FFF2-40B4-BE49-F238E27FC236}">
+                <a16:creationId xmlns:a16="http://schemas.microsoft.com/office/drawing/2014/main" id="{598E868C-2161-3F70-9E5A-5C38113B1CCD}"/>
+              </a:ext>
+            </a:extLst>
+          </p:cNvPr>
+          <p:cNvSpPr>
+            <a:spLocks noGrp="1"/>
+          </p:cNvSpPr>
+          <p:nvPr>
+            <p:ph type="title"/>
+          </p:nvPr>
+        </p:nvSpPr>
+        <p:spPr/>
+        <p:txBody>
+          <a:bodyPr/>
+          <a:lstStyle/>
+          <a:p>
+            <a:r>
+              <a:rPr lang="en-US"/>
+              <a:t>Click to edit Master title style</a:t>
+            </a:r>
+            <a:endParaRPr lang="en-AU"/>
+          </a:p>
+        </p:txBody>
+      </p:sp>
+    </p:spTree>
+    <p:extLst>
+      <p:ext uri="{BB962C8B-B14F-4D97-AF65-F5344CB8AC3E}">
+        <p14:creationId xmlns:p14="http://schemas.microsoft.com/office/powerpoint/2010/main" val="3810044697"/>
+      </p:ext>
+    </p:extLst>
+  </p:cSld>
+  <p:clrMapOvr>
+    <a:masterClrMapping/>
+  </p:clrMapOvr>
+</p:sldLayout>
+</file>
+
+<file path=ppt/slideLayouts/slideLayout8.xml><?xml version="1.0" encoding="utf-8"?>
+<p:sldLayout xmlns:a="http://schemas.openxmlformats.org/drawingml/2006/main" xmlns:r="http://schemas.openxmlformats.org/officeDocument/2006/relationships" xmlns:p="http://schemas.openxmlformats.org/presentationml/2006/main" preserve="1" userDrawn="1">
+  <p:cSld name="Content with Caption">
+    <p:spTree>
+      <p:nvGrpSpPr>
+        <p:cNvPr id="1" name=""/>
+        <p:cNvGrpSpPr/>
+        <p:nvPr/>
+      </p:nvGrpSpPr>
+      <p:grpSpPr>
+        <a:xfrm>
+          <a:off x="0" y="0"/>
+          <a:ext cx="0" cy="0"/>
+          <a:chOff x="0" y="0"/>
+          <a:chExt cx="0" cy="0"/>
+        </a:xfrm>
+      </p:grpSpPr>
+      <p:sp>
+        <p:nvSpPr>
+          <p:cNvPr id="2" name="Title 1">
+            <a:extLst>
+              <a:ext uri="{FF2B5EF4-FFF2-40B4-BE49-F238E27FC236}">
+                <a16:creationId xmlns:a16="http://schemas.microsoft.com/office/drawing/2014/main" id="{27AED932-2FE5-9703-B8AE-C45091E0F0E2}"/>
+              </a:ext>
+            </a:extLst>
+          </p:cNvPr>
+          <p:cNvSpPr>
+            <a:spLocks noGrp="1"/>
+          </p:cNvSpPr>
+          <p:nvPr>
+            <p:ph type="title"/>
+          </p:nvPr>
+        </p:nvSpPr>
+        <p:spPr/>
+        <p:txBody>
+          <a:bodyPr/>
+          <a:lstStyle/>
+          <a:p>
+            <a:r>
+              <a:rPr lang="en-US"/>
+              <a:t>Click to edit Master title style</a:t>
+            </a:r>
+            <a:endParaRPr lang="en-AU"/>
+          </a:p>
+        </p:txBody>
+      </p:sp>
+    </p:spTree>
+    <p:extLst>
+      <p:ext uri="{BB962C8B-B14F-4D97-AF65-F5344CB8AC3E}">
+        <p14:creationId xmlns:p14="http://schemas.microsoft.com/office/powerpoint/2010/main" val="1484287047"/>
+      </p:ext>
+    </p:extLst>
+  </p:cSld>
+  <p:clrMapOvr>
+    <a:masterClrMapping/>
+  </p:clrMapOvr>
+</p:sldLayout>
+</file>
+
 <file path=ppt/slideMasters/slideMaster1.xml><?xml version="1.0" encoding="utf-8"?>
 <p:sldMaster xmlns:a="http://schemas.openxmlformats.org/drawingml/2006/main" xmlns:r="http://schemas.openxmlformats.org/officeDocument/2006/relationships" xmlns:p="http://schemas.openxmlformats.org/presentationml/2006/main">
   <p:cSld>
@@ -2120,7 +2297,7 @@
           <p:nvPr userDrawn="1"/>
         </p:nvPicPr>
         <p:blipFill>
-          <a:blip r:embed="rId7" cstate="print"/>
+          <a:blip r:embed="rId10" cstate="print"/>
           <a:srcRect/>
           <a:stretch>
             <a:fillRect/>
@@ -2178,7 +2355,7 @@
           <a:p>
             <a:fld id="{862C827D-FC0C-184A-B855-165F1307D257}" type="datetimeFigureOut">
               <a:rPr lang="en-US" smtClean="0"/>
-              <a:t>5/21/20</a:t>
+              <a:t>4/1/22</a:t>
             </a:fld>
             <a:endParaRPr lang="en-US"/>
           </a:p>
@@ -2283,6 +2460,9 @@
     <p:sldLayoutId id="2147483663" r:id="rId3"/>
     <p:sldLayoutId id="2147483664" r:id="rId4"/>
     <p:sldLayoutId id="2147483655" r:id="rId5"/>
+    <p:sldLayoutId id="2147483665" r:id="rId6"/>
+    <p:sldLayoutId id="2147483666" r:id="rId7"/>
+    <p:sldLayoutId id="2147483667" r:id="rId8"/>
   </p:sldLayoutIdLst>
   <p:hf hdr="0" ftr="0" dt="0"/>
   <p:txStyles>

</xml_diff>

<commit_message>
adjust the template numbering
</commit_message>
<xml_diff>
--- a/inst/extdata/template_169.pptx
+++ b/inst/extdata/template_169.pptx
@@ -956,7 +956,7 @@
           <a:p>
             <a:fld id="{862C827D-FC0C-184A-B855-165F1307D257}" type="datetimeFigureOut">
               <a:rPr lang="en-US" smtClean="0"/>
-              <a:t>4/1/22</a:t>
+              <a:t>9/30/2022</a:t>
             </a:fld>
             <a:endParaRPr lang="en-US"/>
           </a:p>
@@ -1306,7 +1306,7 @@
           <a:p>
             <a:fld id="{862C827D-FC0C-184A-B855-165F1307D257}" type="datetimeFigureOut">
               <a:rPr lang="en-US" smtClean="0"/>
-              <a:t>4/1/22</a:t>
+              <a:t>9/30/2022</a:t>
             </a:fld>
             <a:endParaRPr lang="en-US"/>
           </a:p>
@@ -1610,7 +1610,7 @@
           <a:p>
             <a:fld id="{862C827D-FC0C-184A-B855-165F1307D257}" type="datetimeFigureOut">
               <a:rPr lang="en-US" smtClean="0"/>
-              <a:t>4/1/22</a:t>
+              <a:t>9/30/2022</a:t>
             </a:fld>
             <a:endParaRPr lang="en-US"/>
           </a:p>
@@ -1749,124 +1749,6 @@
               <a:t>Click to edit Master subtitle style</a:t>
             </a:r>
             <a:endParaRPr lang="en-AU" dirty="0"/>
-          </a:p>
-        </p:txBody>
-      </p:sp>
-      <p:sp>
-        <p:nvSpPr>
-          <p:cNvPr id="133124" name="Rectangle 4"/>
-          <p:cNvSpPr>
-            <a:spLocks noGrp="1" noChangeArrowheads="1"/>
-          </p:cNvSpPr>
-          <p:nvPr>
-            <p:ph type="dt" sz="half" idx="2"/>
-          </p:nvPr>
-        </p:nvSpPr>
-        <p:spPr bwMode="auto">
-          <a:xfrm>
-            <a:off x="609600" y="6245225"/>
-            <a:ext cx="2844800" cy="476250"/>
-          </a:xfrm>
-          <a:prstGeom prst="rect">
-            <a:avLst/>
-          </a:prstGeom>
-          <a:noFill/>
-          <a:ln>
-            <a:miter lim="800000"/>
-            <a:headEnd/>
-            <a:tailEnd/>
-          </a:ln>
-        </p:spPr>
-        <p:txBody>
-          <a:bodyPr vert="horz" wrap="square" lIns="0" tIns="0" rIns="0" bIns="0" numCol="1" anchor="t" anchorCtr="0" compatLnSpc="1">
-            <a:prstTxWarp prst="textNoShape">
-              <a:avLst/>
-            </a:prstTxWarp>
-          </a:bodyPr>
-          <a:lstStyle>
-            <a:lvl1pPr>
-              <a:defRPr sz="1292"/>
-            </a:lvl1pPr>
-          </a:lstStyle>
-          <a:p>
-            <a:endParaRPr lang="en-US"/>
-          </a:p>
-        </p:txBody>
-      </p:sp>
-      <p:sp>
-        <p:nvSpPr>
-          <p:cNvPr id="133125" name="Rectangle 5"/>
-          <p:cNvSpPr>
-            <a:spLocks noGrp="1" noChangeArrowheads="1"/>
-          </p:cNvSpPr>
-          <p:nvPr>
-            <p:ph type="ftr" sz="quarter" idx="3"/>
-          </p:nvPr>
-        </p:nvSpPr>
-        <p:spPr bwMode="auto">
-          <a:xfrm>
-            <a:off x="4165600" y="6245225"/>
-            <a:ext cx="3860800" cy="476250"/>
-          </a:xfrm>
-          <a:prstGeom prst="rect">
-            <a:avLst/>
-          </a:prstGeom>
-          <a:noFill/>
-          <a:ln>
-            <a:miter lim="800000"/>
-            <a:headEnd/>
-            <a:tailEnd/>
-          </a:ln>
-        </p:spPr>
-        <p:txBody>
-          <a:bodyPr vert="horz" wrap="square" lIns="0" tIns="0" rIns="0" bIns="0" numCol="1" anchor="t" anchorCtr="0" compatLnSpc="1">
-            <a:prstTxWarp prst="textNoShape">
-              <a:avLst/>
-            </a:prstTxWarp>
-          </a:bodyPr>
-          <a:lstStyle>
-            <a:lvl1pPr algn="ctr">
-              <a:defRPr sz="1292"/>
-            </a:lvl1pPr>
-          </a:lstStyle>
-          <a:p>
-            <a:endParaRPr lang="en-US"/>
-          </a:p>
-        </p:txBody>
-      </p:sp>
-      <p:sp>
-        <p:nvSpPr>
-          <p:cNvPr id="133126" name="Rectangle 6"/>
-          <p:cNvSpPr>
-            <a:spLocks noGrp="1" noChangeArrowheads="1"/>
-          </p:cNvSpPr>
-          <p:nvPr>
-            <p:ph type="sldNum" sz="quarter" idx="4"/>
-          </p:nvPr>
-        </p:nvSpPr>
-        <p:spPr>
-          <a:xfrm>
-            <a:off x="8737600" y="6245225"/>
-            <a:ext cx="2844800" cy="476250"/>
-          </a:xfrm>
-          <a:prstGeom prst="rect">
-            <a:avLst/>
-          </a:prstGeom>
-        </p:spPr>
-        <p:txBody>
-          <a:bodyPr lIns="0" tIns="0" rIns="0" bIns="0"/>
-          <a:lstStyle>
-            <a:lvl1pPr eaLnBrk="0" hangingPunct="0">
-              <a:defRPr sz="1292" i="0"/>
-            </a:lvl1pPr>
-          </a:lstStyle>
-          <a:p>
-            <a:fld id="{3E7C0CC8-E12B-4B1E-958E-BC6C5916F62C}" type="slidenum">
-              <a:rPr lang="en-US" smtClean="0"/>
-              <a:pPr/>
-              <a:t>‹#›</a:t>
-            </a:fld>
-            <a:endParaRPr lang="en-US"/>
           </a:p>
         </p:txBody>
       </p:sp>
@@ -2355,7 +2237,7 @@
           <a:p>
             <a:fld id="{862C827D-FC0C-184A-B855-165F1307D257}" type="datetimeFigureOut">
               <a:rPr lang="en-US" smtClean="0"/>
-              <a:t>4/1/22</a:t>
+              <a:t>9/30/2022</a:t>
             </a:fld>
             <a:endParaRPr lang="en-US"/>
           </a:p>

</xml_diff>